<commit_message>
Fix the links to the Haunted Houes example in StateMachine.pptx.
</commit_message>
<xml_diff>
--- a/NiklasB/StateMachine.pptx
+++ b/NiklasB/StateMachine.pptx
@@ -215,7 +215,7 @@
           <a:p>
             <a:fld id="{0E6BCC00-A57C-4A97-A54D-1B376CC71393}" type="datetimeFigureOut">
               <a:rPr lang="en-US" smtClean="0"/>
-              <a:t>1/18/2018</a:t>
+              <a:t>1/20/2018</a:t>
             </a:fld>
             <a:endParaRPr lang="en-US"/>
           </a:p>
@@ -1889,7 +1889,7 @@
           <a:p>
             <a:fld id="{DB2319FB-0869-42CE-9AFD-B9A82D86A249}" type="datetimeFigureOut">
               <a:rPr lang="en-US" smtClean="0"/>
-              <a:t>1/18/2018</a:t>
+              <a:t>1/20/2018</a:t>
             </a:fld>
             <a:endParaRPr lang="en-US"/>
           </a:p>
@@ -2087,7 +2087,7 @@
           <a:p>
             <a:fld id="{DB2319FB-0869-42CE-9AFD-B9A82D86A249}" type="datetimeFigureOut">
               <a:rPr lang="en-US" smtClean="0"/>
-              <a:t>1/18/2018</a:t>
+              <a:t>1/20/2018</a:t>
             </a:fld>
             <a:endParaRPr lang="en-US"/>
           </a:p>
@@ -2295,7 +2295,7 @@
           <a:p>
             <a:fld id="{DB2319FB-0869-42CE-9AFD-B9A82D86A249}" type="datetimeFigureOut">
               <a:rPr lang="en-US" smtClean="0"/>
-              <a:t>1/18/2018</a:t>
+              <a:t>1/20/2018</a:t>
             </a:fld>
             <a:endParaRPr lang="en-US"/>
           </a:p>
@@ -2493,7 +2493,7 @@
           <a:p>
             <a:fld id="{DB2319FB-0869-42CE-9AFD-B9A82D86A249}" type="datetimeFigureOut">
               <a:rPr lang="en-US" smtClean="0"/>
-              <a:t>1/18/2018</a:t>
+              <a:t>1/20/2018</a:t>
             </a:fld>
             <a:endParaRPr lang="en-US"/>
           </a:p>
@@ -2768,7 +2768,7 @@
           <a:p>
             <a:fld id="{DB2319FB-0869-42CE-9AFD-B9A82D86A249}" type="datetimeFigureOut">
               <a:rPr lang="en-US" smtClean="0"/>
-              <a:t>1/18/2018</a:t>
+              <a:t>1/20/2018</a:t>
             </a:fld>
             <a:endParaRPr lang="en-US"/>
           </a:p>
@@ -3033,7 +3033,7 @@
           <a:p>
             <a:fld id="{DB2319FB-0869-42CE-9AFD-B9A82D86A249}" type="datetimeFigureOut">
               <a:rPr lang="en-US" smtClean="0"/>
-              <a:t>1/18/2018</a:t>
+              <a:t>1/20/2018</a:t>
             </a:fld>
             <a:endParaRPr lang="en-US"/>
           </a:p>
@@ -3445,7 +3445,7 @@
           <a:p>
             <a:fld id="{DB2319FB-0869-42CE-9AFD-B9A82D86A249}" type="datetimeFigureOut">
               <a:rPr lang="en-US" smtClean="0"/>
-              <a:t>1/18/2018</a:t>
+              <a:t>1/20/2018</a:t>
             </a:fld>
             <a:endParaRPr lang="en-US"/>
           </a:p>
@@ -3586,7 +3586,7 @@
           <a:p>
             <a:fld id="{DB2319FB-0869-42CE-9AFD-B9A82D86A249}" type="datetimeFigureOut">
               <a:rPr lang="en-US" smtClean="0"/>
-              <a:t>1/18/2018</a:t>
+              <a:t>1/20/2018</a:t>
             </a:fld>
             <a:endParaRPr lang="en-US"/>
           </a:p>
@@ -3699,7 +3699,7 @@
           <a:p>
             <a:fld id="{DB2319FB-0869-42CE-9AFD-B9A82D86A249}" type="datetimeFigureOut">
               <a:rPr lang="en-US" smtClean="0"/>
-              <a:t>1/18/2018</a:t>
+              <a:t>1/20/2018</a:t>
             </a:fld>
             <a:endParaRPr lang="en-US"/>
           </a:p>
@@ -4010,7 +4010,7 @@
           <a:p>
             <a:fld id="{DB2319FB-0869-42CE-9AFD-B9A82D86A249}" type="datetimeFigureOut">
               <a:rPr lang="en-US" smtClean="0"/>
-              <a:t>1/18/2018</a:t>
+              <a:t>1/20/2018</a:t>
             </a:fld>
             <a:endParaRPr lang="en-US"/>
           </a:p>
@@ -4298,7 +4298,7 @@
           <a:p>
             <a:fld id="{DB2319FB-0869-42CE-9AFD-B9A82D86A249}" type="datetimeFigureOut">
               <a:rPr lang="en-US" smtClean="0"/>
-              <a:t>1/18/2018</a:t>
+              <a:t>1/20/2018</a:t>
             </a:fld>
             <a:endParaRPr lang="en-US"/>
           </a:p>
@@ -4539,7 +4539,7 @@
           <a:p>
             <a:fld id="{DB2319FB-0869-42CE-9AFD-B9A82D86A249}" type="datetimeFigureOut">
               <a:rPr lang="en-US" smtClean="0"/>
-              <a:t>1/18/2018</a:t>
+              <a:t>1/20/2018</a:t>
             </a:fld>
             <a:endParaRPr lang="en-US"/>
           </a:p>
@@ -7091,7 +7091,7 @@
           <a:p>
             <a:r>
               <a:rPr lang="en-US" dirty="0">
-                <a:hlinkClick r:id="rId3" action="ppaction://hlinkfile"/>
+                <a:hlinkClick r:id="rId3"/>
               </a:rPr>
               <a:t>Haunted house example</a:t>
             </a:r>
@@ -11306,7 +11306,7 @@
             </a:r>
             <a:r>
               <a:rPr lang="en-US" dirty="0">
-                <a:hlinkClick r:id="rId3" action="ppaction://hlinkfile"/>
+                <a:hlinkClick r:id="rId3"/>
               </a:rPr>
               <a:t>haunted house</a:t>
             </a:r>
@@ -12420,7 +12420,7 @@
             </a:r>
             <a:r>
               <a:rPr lang="en-US" dirty="0">
-                <a:hlinkClick r:id="rId3" action="ppaction://hlinkfile"/>
+                <a:hlinkClick r:id="rId3"/>
               </a:rPr>
               <a:t>HTML version</a:t>
             </a:r>

</xml_diff>